<commit_message>
menambahkan jupyter dan seaborn
</commit_message>
<xml_diff>
--- a/Tugas Pertama/Tugas Pertama AbalJerind Pengantar Deep Learning.pptx
+++ b/Tugas Pertama/Tugas Pertama AbalJerind Pengantar Deep Learning.pptx
@@ -5,7 +5,7 @@
     <p:sldMasterId id="2147483696" r:id="rId1"/>
   </p:sldMasterIdLst>
   <p:notesMasterIdLst>
-    <p:notesMasterId r:id="rId27"/>
+    <p:notesMasterId r:id="rId29"/>
   </p:notesMasterIdLst>
   <p:sldIdLst>
     <p:sldId id="256" r:id="rId2"/>
@@ -31,8 +31,10 @@
     <p:sldId id="279" r:id="rId22"/>
     <p:sldId id="280" r:id="rId23"/>
     <p:sldId id="281" r:id="rId24"/>
-    <p:sldId id="282" r:id="rId25"/>
-    <p:sldId id="264" r:id="rId26"/>
+    <p:sldId id="283" r:id="rId25"/>
+    <p:sldId id="284" r:id="rId26"/>
+    <p:sldId id="282" r:id="rId27"/>
+    <p:sldId id="264" r:id="rId28"/>
   </p:sldIdLst>
   <p:sldSz cx="9144000" cy="6858000" type="screen4x3"/>
   <p:notesSz cx="6858000" cy="9144000"/>
@@ -216,7 +218,7 @@
           <a:p>
             <a:fld id="{C68BA279-9BF2-4A06-B9AF-8A73EDCCA3E2}" type="datetimeFigureOut">
               <a:rPr lang="en-US" smtClean="0"/>
-              <a:t>23-Mar-19</a:t>
+              <a:t>30-Mar-19</a:t>
             </a:fld>
             <a:endParaRPr lang="en-US"/>
           </a:p>
@@ -760,7 +762,7 @@
           <a:p>
             <a:fld id="{F928AF0E-B02C-4F75-988D-F732CEEC776A}" type="datetimeFigureOut">
               <a:rPr lang="en-US" smtClean="0"/>
-              <a:t>23-Mar-19</a:t>
+              <a:t>30-Mar-19</a:t>
             </a:fld>
             <a:endParaRPr lang="en-US"/>
           </a:p>
@@ -925,7 +927,7 @@
           <a:p>
             <a:fld id="{F928AF0E-B02C-4F75-988D-F732CEEC776A}" type="datetimeFigureOut">
               <a:rPr lang="en-US" smtClean="0"/>
-              <a:t>23-Mar-19</a:t>
+              <a:t>30-Mar-19</a:t>
             </a:fld>
             <a:endParaRPr lang="en-US"/>
           </a:p>
@@ -1100,7 +1102,7 @@
           <a:p>
             <a:fld id="{F928AF0E-B02C-4F75-988D-F732CEEC776A}" type="datetimeFigureOut">
               <a:rPr lang="en-US" smtClean="0"/>
-              <a:t>23-Mar-19</a:t>
+              <a:t>30-Mar-19</a:t>
             </a:fld>
             <a:endParaRPr lang="en-US"/>
           </a:p>
@@ -1283,7 +1285,7 @@
           <a:p>
             <a:fld id="{F928AF0E-B02C-4F75-988D-F732CEEC776A}" type="datetimeFigureOut">
               <a:rPr lang="en-US" smtClean="0"/>
-              <a:t>23-Mar-19</a:t>
+              <a:t>30-Mar-19</a:t>
             </a:fld>
             <a:endParaRPr lang="en-US"/>
           </a:p>
@@ -1545,7 +1547,7 @@
           <a:p>
             <a:fld id="{F928AF0E-B02C-4F75-988D-F732CEEC776A}" type="datetimeFigureOut">
               <a:rPr lang="en-US" smtClean="0"/>
-              <a:t>23-Mar-19</a:t>
+              <a:t>30-Mar-19</a:t>
             </a:fld>
             <a:endParaRPr lang="en-US"/>
           </a:p>
@@ -1893,7 +1895,7 @@
           <a:p>
             <a:fld id="{F928AF0E-B02C-4F75-988D-F732CEEC776A}" type="datetimeFigureOut">
               <a:rPr lang="en-US" smtClean="0"/>
-              <a:t>23-Mar-19</a:t>
+              <a:t>30-Mar-19</a:t>
             </a:fld>
             <a:endParaRPr lang="en-US"/>
           </a:p>
@@ -2201,7 +2203,7 @@
           <a:p>
             <a:fld id="{F928AF0E-B02C-4F75-988D-F732CEEC776A}" type="datetimeFigureOut">
               <a:rPr lang="en-US" smtClean="0"/>
-              <a:t>23-Mar-19</a:t>
+              <a:t>30-Mar-19</a:t>
             </a:fld>
             <a:endParaRPr lang="en-US"/>
           </a:p>
@@ -2428,7 +2430,7 @@
           <a:p>
             <a:fld id="{F928AF0E-B02C-4F75-988D-F732CEEC776A}" type="datetimeFigureOut">
               <a:rPr lang="en-US" smtClean="0"/>
-              <a:t>23-Mar-19</a:t>
+              <a:t>30-Mar-19</a:t>
             </a:fld>
             <a:endParaRPr lang="en-US"/>
           </a:p>
@@ -2518,7 +2520,7 @@
           <a:p>
             <a:fld id="{F928AF0E-B02C-4F75-988D-F732CEEC776A}" type="datetimeFigureOut">
               <a:rPr lang="en-US" smtClean="0"/>
-              <a:t>23-Mar-19</a:t>
+              <a:t>30-Mar-19</a:t>
             </a:fld>
             <a:endParaRPr lang="en-US"/>
           </a:p>
@@ -2806,7 +2808,7 @@
           <a:p>
             <a:fld id="{F928AF0E-B02C-4F75-988D-F732CEEC776A}" type="datetimeFigureOut">
               <a:rPr lang="en-US" smtClean="0"/>
-              <a:t>23-Mar-19</a:t>
+              <a:t>30-Mar-19</a:t>
             </a:fld>
             <a:endParaRPr lang="en-US"/>
           </a:p>
@@ -3075,7 +3077,7 @@
           <a:p>
             <a:fld id="{F928AF0E-B02C-4F75-988D-F732CEEC776A}" type="datetimeFigureOut">
               <a:rPr lang="en-US" smtClean="0"/>
-              <a:t>23-Mar-19</a:t>
+              <a:t>30-Mar-19</a:t>
             </a:fld>
             <a:endParaRPr lang="en-US"/>
           </a:p>
@@ -3285,7 +3287,7 @@
           <a:p>
             <a:fld id="{F928AF0E-B02C-4F75-988D-F732CEEC776A}" type="datetimeFigureOut">
               <a:rPr lang="en-US" smtClean="0"/>
-              <a:t>23-Mar-19</a:t>
+              <a:t>30-Mar-19</a:t>
             </a:fld>
             <a:endParaRPr lang="en-US"/>
           </a:p>
@@ -14486,6 +14488,42 @@
       </p:grpSpPr>
       <p:sp>
         <p:nvSpPr>
+          <p:cNvPr id="2" name="Title 1"/>
+          <p:cNvSpPr>
+            <a:spLocks noGrp="1"/>
+          </p:cNvSpPr>
+          <p:nvPr>
+            <p:ph type="title"/>
+          </p:nvPr>
+        </p:nvSpPr>
+        <p:spPr/>
+        <p:txBody>
+          <a:bodyPr/>
+          <a:lstStyle/>
+          <a:p>
+            <a:pPr algn="l"/>
+            <a:r>
+              <a:rPr lang="en-US" dirty="0" err="1" smtClean="0"/>
+              <a:t>Jupyter</a:t>
+            </a:r>
+            <a:r>
+              <a:rPr lang="en-US" dirty="0" smtClean="0"/>
+              <a:t> </a:t>
+            </a:r>
+            <a:r>
+              <a:rPr lang="en-US" dirty="0" err="1" smtClean="0"/>
+              <a:t>Pada</a:t>
+            </a:r>
+            <a:r>
+              <a:rPr lang="en-US" dirty="0" smtClean="0"/>
+              <a:t> Python</a:t>
+            </a:r>
+            <a:endParaRPr lang="en-US" dirty="0"/>
+          </a:p>
+        </p:txBody>
+      </p:sp>
+      <p:sp>
+        <p:nvSpPr>
           <p:cNvPr id="3" name="Content Placeholder 2"/>
           <p:cNvSpPr>
             <a:spLocks noGrp="1"/>
@@ -14494,48 +14532,445 @@
             <p:ph idx="1"/>
           </p:nvPr>
         </p:nvSpPr>
-        <p:spPr/>
+        <p:spPr>
+          <a:xfrm>
+            <a:off x="0" y="1600200"/>
+            <a:ext cx="9144000" cy="5257800"/>
+          </a:xfrm>
+        </p:spPr>
         <p:txBody>
           <a:bodyPr>
             <a:normAutofit/>
           </a:bodyPr>
           <a:lstStyle/>
           <a:p>
-            <a:pPr marL="0" indent="0" algn="ctr">
-              <a:buNone/>
-            </a:pPr>
-            <a:endParaRPr lang="en-US" sz="4800" dirty="0" smtClean="0"/>
-          </a:p>
-          <a:p>
-            <a:pPr marL="0" indent="0" algn="ctr">
-              <a:buNone/>
-            </a:pPr>
-            <a:endParaRPr lang="en-US" sz="4800" dirty="0"/>
-          </a:p>
-          <a:p>
-            <a:pPr marL="0" indent="0" algn="ctr">
-              <a:buNone/>
-            </a:pPr>
-            <a:r>
-              <a:rPr lang="en-US" sz="4800" dirty="0" err="1" smtClean="0"/>
-              <a:t>Terima</a:t>
-            </a:r>
-            <a:r>
-              <a:rPr lang="en-US" sz="4800" dirty="0" smtClean="0"/>
-              <a:t> </a:t>
-            </a:r>
-            <a:r>
-              <a:rPr lang="en-US" sz="4800" dirty="0" err="1" smtClean="0"/>
-              <a:t>Kasih</a:t>
-            </a:r>
-            <a:endParaRPr lang="en-US" sz="4800" dirty="0"/>
+            <a:pPr marL="0" indent="0">
+              <a:buNone/>
+            </a:pPr>
+            <a:r>
+              <a:rPr lang="en-US" sz="2000" dirty="0" err="1"/>
+              <a:t>Jupyter</a:t>
+            </a:r>
+            <a:r>
+              <a:rPr lang="en-US" sz="2000" dirty="0"/>
+              <a:t> Notebook </a:t>
+            </a:r>
+            <a:r>
+              <a:rPr lang="en-US" sz="2000" dirty="0" err="1"/>
+              <a:t>adalah</a:t>
+            </a:r>
+            <a:r>
+              <a:rPr lang="en-US" sz="2000" dirty="0"/>
+              <a:t> </a:t>
+            </a:r>
+            <a:r>
+              <a:rPr lang="en-US" sz="2000" dirty="0" err="1"/>
+              <a:t>sebuah</a:t>
+            </a:r>
+            <a:r>
+              <a:rPr lang="en-US" sz="2000" dirty="0"/>
+              <a:t> </a:t>
+            </a:r>
+            <a:r>
+              <a:rPr lang="en-US" sz="2000" dirty="0" err="1"/>
+              <a:t>aplikasi</a:t>
+            </a:r>
+            <a:r>
+              <a:rPr lang="en-US" sz="2000" dirty="0"/>
+              <a:t> open source yang </a:t>
+            </a:r>
+            <a:r>
+              <a:rPr lang="en-US" sz="2000" dirty="0" err="1"/>
+              <a:t>fungsinya</a:t>
+            </a:r>
+            <a:r>
+              <a:rPr lang="en-US" sz="2000" dirty="0"/>
+              <a:t> </a:t>
+            </a:r>
+            <a:r>
+              <a:rPr lang="en-US" sz="2000" dirty="0" err="1"/>
+              <a:t>untuk</a:t>
+            </a:r>
+            <a:r>
+              <a:rPr lang="en-US" sz="2000" dirty="0"/>
+              <a:t> </a:t>
+            </a:r>
+            <a:r>
+              <a:rPr lang="en-US" sz="2000" dirty="0" err="1" smtClean="0"/>
+              <a:t>membuat</a:t>
+            </a:r>
+            <a:r>
+              <a:rPr lang="en-US" sz="2000" dirty="0" smtClean="0"/>
+              <a:t> </a:t>
+            </a:r>
+            <a:r>
+              <a:rPr lang="en-US" sz="2000" dirty="0" err="1"/>
+              <a:t>dan</a:t>
+            </a:r>
+            <a:r>
+              <a:rPr lang="en-US" sz="2000" dirty="0"/>
+              <a:t> </a:t>
+            </a:r>
+            <a:r>
+              <a:rPr lang="en-US" sz="2000" dirty="0" err="1"/>
+              <a:t>berbagi</a:t>
+            </a:r>
+            <a:r>
+              <a:rPr lang="en-US" sz="2000" dirty="0"/>
+              <a:t> </a:t>
+            </a:r>
+            <a:r>
+              <a:rPr lang="en-US" sz="2000" dirty="0" err="1"/>
+              <a:t>dokumen</a:t>
+            </a:r>
+            <a:r>
+              <a:rPr lang="en-US" sz="2000" dirty="0"/>
+              <a:t> yang </a:t>
+            </a:r>
+            <a:r>
+              <a:rPr lang="en-US" sz="2000" dirty="0" err="1"/>
+              <a:t>berisi</a:t>
+            </a:r>
+            <a:r>
+              <a:rPr lang="en-US" sz="2000" dirty="0"/>
+              <a:t> live code, </a:t>
+            </a:r>
+            <a:r>
+              <a:rPr lang="en-US" sz="2000" dirty="0" err="1"/>
+              <a:t>persamaan</a:t>
+            </a:r>
+            <a:r>
+              <a:rPr lang="en-US" sz="2000" dirty="0"/>
+              <a:t>, </a:t>
+            </a:r>
+            <a:r>
+              <a:rPr lang="en-US" sz="2000" dirty="0" err="1"/>
+              <a:t>visualisasi</a:t>
+            </a:r>
+            <a:r>
+              <a:rPr lang="en-US" sz="2000" dirty="0"/>
+              <a:t> </a:t>
+            </a:r>
+            <a:r>
+              <a:rPr lang="en-US" sz="2000" dirty="0" err="1"/>
+              <a:t>dan</a:t>
+            </a:r>
+            <a:r>
+              <a:rPr lang="en-US" sz="2000" dirty="0"/>
+              <a:t> </a:t>
+            </a:r>
+            <a:r>
+              <a:rPr lang="en-US" sz="2000" dirty="0" err="1"/>
+              <a:t>teks</a:t>
+            </a:r>
+            <a:r>
+              <a:rPr lang="en-US" sz="2000" dirty="0"/>
+              <a:t> </a:t>
+            </a:r>
+            <a:r>
+              <a:rPr lang="en-US" sz="2000" dirty="0" err="1"/>
+              <a:t>penjelasan</a:t>
+            </a:r>
+            <a:r>
+              <a:rPr lang="en-US" sz="2000" dirty="0" smtClean="0"/>
+              <a:t>. </a:t>
+            </a:r>
+            <a:r>
+              <a:rPr lang="en-US" sz="2000" dirty="0" err="1" smtClean="0"/>
+              <a:t>Untuk</a:t>
+            </a:r>
+            <a:r>
+              <a:rPr lang="en-US" sz="2000" dirty="0" smtClean="0"/>
+              <a:t> </a:t>
+            </a:r>
+            <a:r>
+              <a:rPr lang="en-US" sz="2000" dirty="0" err="1" smtClean="0"/>
+              <a:t>menginstall</a:t>
+            </a:r>
+            <a:r>
+              <a:rPr lang="en-US" sz="2000" dirty="0" smtClean="0"/>
+              <a:t> </a:t>
+            </a:r>
+            <a:r>
+              <a:rPr lang="en-US" sz="2000" dirty="0" err="1" smtClean="0"/>
+              <a:t>Jupyter</a:t>
+            </a:r>
+            <a:r>
+              <a:rPr lang="en-US" sz="2000" dirty="0" smtClean="0"/>
+              <a:t>, </a:t>
+            </a:r>
+            <a:r>
+              <a:rPr lang="en-US" sz="2000" dirty="0" err="1" smtClean="0"/>
+              <a:t>kita</a:t>
+            </a:r>
+            <a:r>
+              <a:rPr lang="en-US" sz="2000" dirty="0" smtClean="0"/>
+              <a:t> </a:t>
+            </a:r>
+            <a:r>
+              <a:rPr lang="en-US" sz="2000" dirty="0" err="1" smtClean="0"/>
+              <a:t>bisa</a:t>
+            </a:r>
+            <a:r>
+              <a:rPr lang="en-US" sz="2000" dirty="0" smtClean="0"/>
+              <a:t> </a:t>
+            </a:r>
+            <a:r>
+              <a:rPr lang="en-US" sz="2000" dirty="0" err="1" smtClean="0"/>
+              <a:t>menginstall</a:t>
+            </a:r>
+            <a:r>
+              <a:rPr lang="en-US" sz="2000" dirty="0" smtClean="0"/>
+              <a:t> Anaconda </a:t>
+            </a:r>
+            <a:r>
+              <a:rPr lang="en-US" sz="2000" dirty="0" err="1" smtClean="0"/>
+              <a:t>karena</a:t>
+            </a:r>
+            <a:r>
+              <a:rPr lang="en-US" sz="2000" dirty="0" smtClean="0"/>
+              <a:t> di </a:t>
+            </a:r>
+            <a:r>
+              <a:rPr lang="en-US" sz="2000" dirty="0" err="1" smtClean="0"/>
+              <a:t>dalamnya</a:t>
+            </a:r>
+            <a:r>
+              <a:rPr lang="en-US" sz="2000" dirty="0" smtClean="0"/>
+              <a:t> </a:t>
+            </a:r>
+            <a:r>
+              <a:rPr lang="en-US" sz="2000" dirty="0" err="1" smtClean="0"/>
+              <a:t>terdapat</a:t>
+            </a:r>
+            <a:r>
+              <a:rPr lang="en-US" sz="2000" dirty="0" smtClean="0"/>
+              <a:t> </a:t>
+            </a:r>
+            <a:r>
+              <a:rPr lang="en-US" sz="2000" dirty="0" err="1" smtClean="0"/>
+              <a:t>Jupyter</a:t>
+            </a:r>
+            <a:r>
+              <a:rPr lang="en-US" sz="2000" dirty="0" smtClean="0"/>
+              <a:t>. </a:t>
+            </a:r>
+            <a:r>
+              <a:rPr lang="en-US" sz="2000" dirty="0" err="1" smtClean="0"/>
+              <a:t>Setelah</a:t>
+            </a:r>
+            <a:r>
+              <a:rPr lang="en-US" sz="2000" dirty="0" smtClean="0"/>
+              <a:t> </a:t>
+            </a:r>
+            <a:r>
+              <a:rPr lang="en-US" sz="2000" dirty="0" err="1" smtClean="0"/>
+              <a:t>menginstall</a:t>
+            </a:r>
+            <a:r>
+              <a:rPr lang="en-US" sz="2000" dirty="0" smtClean="0"/>
+              <a:t> Anaconda </a:t>
+            </a:r>
+            <a:r>
+              <a:rPr lang="en-US" sz="2000" dirty="0" err="1" smtClean="0"/>
+              <a:t>kita</a:t>
+            </a:r>
+            <a:r>
+              <a:rPr lang="en-US" sz="2000" dirty="0" smtClean="0"/>
+              <a:t> </a:t>
+            </a:r>
+            <a:r>
+              <a:rPr lang="en-US" sz="2000" dirty="0" err="1" smtClean="0"/>
+              <a:t>dapat</a:t>
+            </a:r>
+            <a:r>
+              <a:rPr lang="en-US" sz="2000" dirty="0" smtClean="0"/>
+              <a:t> </a:t>
+            </a:r>
+            <a:r>
+              <a:rPr lang="en-US" sz="2000" dirty="0" err="1" smtClean="0"/>
+              <a:t>membuka</a:t>
+            </a:r>
+            <a:r>
+              <a:rPr lang="en-US" sz="2000" dirty="0" smtClean="0"/>
+              <a:t> </a:t>
+            </a:r>
+            <a:r>
+              <a:rPr lang="en-US" sz="2000" dirty="0" err="1" smtClean="0"/>
+              <a:t>Jupyter</a:t>
+            </a:r>
+            <a:r>
+              <a:rPr lang="en-US" sz="2000" dirty="0" smtClean="0"/>
+              <a:t> Notebook </a:t>
+            </a:r>
+            <a:r>
+              <a:rPr lang="en-US" sz="2000" dirty="0" err="1" smtClean="0"/>
+              <a:t>dengan</a:t>
+            </a:r>
+            <a:r>
+              <a:rPr lang="en-US" sz="2000" dirty="0" smtClean="0"/>
+              <a:t> 2 </a:t>
+            </a:r>
+            <a:r>
+              <a:rPr lang="en-US" sz="2000" dirty="0" err="1" smtClean="0"/>
+              <a:t>cara</a:t>
+            </a:r>
+            <a:r>
+              <a:rPr lang="en-US" sz="2000" dirty="0" smtClean="0"/>
+              <a:t> </a:t>
+            </a:r>
+            <a:r>
+              <a:rPr lang="en-US" sz="2000" dirty="0" err="1" smtClean="0"/>
+              <a:t>yaitu</a:t>
+            </a:r>
+            <a:r>
+              <a:rPr lang="en-US" sz="2000" dirty="0" smtClean="0"/>
+              <a:t> </a:t>
+            </a:r>
+            <a:r>
+              <a:rPr lang="en-US" sz="2000" dirty="0" err="1" smtClean="0"/>
+              <a:t>langsung</a:t>
+            </a:r>
+            <a:r>
+              <a:rPr lang="en-US" sz="2000" dirty="0" smtClean="0"/>
+              <a:t> </a:t>
+            </a:r>
+            <a:r>
+              <a:rPr lang="en-US" sz="2000" dirty="0" err="1" smtClean="0"/>
+              <a:t>mengklik</a:t>
+            </a:r>
+            <a:r>
+              <a:rPr lang="en-US" sz="2000" dirty="0" smtClean="0"/>
+              <a:t> </a:t>
+            </a:r>
+            <a:r>
+              <a:rPr lang="en-US" sz="2000" dirty="0" err="1" smtClean="0"/>
+              <a:t>Jupyter</a:t>
+            </a:r>
+            <a:r>
+              <a:rPr lang="en-US" sz="2000" dirty="0" smtClean="0"/>
+              <a:t> Notebook </a:t>
+            </a:r>
+            <a:r>
+              <a:rPr lang="en-US" sz="2000" dirty="0" err="1" smtClean="0"/>
+              <a:t>pada</a:t>
+            </a:r>
+            <a:r>
+              <a:rPr lang="en-US" sz="2000" dirty="0" smtClean="0"/>
+              <a:t> start  </a:t>
+            </a:r>
+            <a:r>
+              <a:rPr lang="en-US" sz="2000" dirty="0" err="1" smtClean="0"/>
+              <a:t>atau</a:t>
+            </a:r>
+            <a:r>
+              <a:rPr lang="en-US" sz="2000" dirty="0" smtClean="0"/>
+              <a:t> </a:t>
+            </a:r>
+            <a:r>
+              <a:rPr lang="en-US" sz="2000" dirty="0" err="1" smtClean="0"/>
+              <a:t>dengan</a:t>
+            </a:r>
+            <a:r>
+              <a:rPr lang="en-US" sz="2000" dirty="0" smtClean="0"/>
+              <a:t> </a:t>
+            </a:r>
+            <a:r>
+              <a:rPr lang="en-US" sz="2000" dirty="0" err="1" smtClean="0"/>
+              <a:t>membuka</a:t>
+            </a:r>
+            <a:r>
+              <a:rPr lang="en-US" sz="2000" dirty="0" smtClean="0"/>
+              <a:t> Anaconda Prompt </a:t>
+            </a:r>
+            <a:r>
+              <a:rPr lang="en-US" sz="2000" dirty="0" err="1" smtClean="0"/>
+              <a:t>pada</a:t>
+            </a:r>
+            <a:r>
+              <a:rPr lang="en-US" sz="2000" dirty="0" smtClean="0"/>
+              <a:t> start </a:t>
+            </a:r>
+            <a:r>
+              <a:rPr lang="en-US" sz="2000" dirty="0" err="1" smtClean="0"/>
+              <a:t>lalu</a:t>
+            </a:r>
+            <a:r>
+              <a:rPr lang="en-US" sz="2000" dirty="0" smtClean="0"/>
+              <a:t> </a:t>
+            </a:r>
+            <a:r>
+              <a:rPr lang="en-US" sz="2000" dirty="0" err="1" smtClean="0"/>
+              <a:t>mengetikkan</a:t>
+            </a:r>
+            <a:r>
+              <a:rPr lang="en-US" sz="2000" dirty="0" smtClean="0"/>
+              <a:t> </a:t>
+            </a:r>
+            <a:r>
+              <a:rPr lang="en-US" sz="2000" dirty="0" err="1" smtClean="0"/>
+              <a:t>Jupyter</a:t>
+            </a:r>
+            <a:r>
+              <a:rPr lang="en-US" sz="2000" dirty="0" smtClean="0"/>
+              <a:t> Notebook. </a:t>
+            </a:r>
+            <a:r>
+              <a:rPr lang="en-US" sz="2000" dirty="0" err="1" smtClean="0"/>
+              <a:t>Maka</a:t>
+            </a:r>
+            <a:r>
+              <a:rPr lang="en-US" sz="2000" dirty="0" smtClean="0"/>
+              <a:t> </a:t>
+            </a:r>
+            <a:r>
+              <a:rPr lang="en-US" sz="2000" dirty="0" err="1" smtClean="0"/>
+              <a:t>Jupyter</a:t>
+            </a:r>
+            <a:r>
+              <a:rPr lang="en-US" sz="2000" dirty="0" smtClean="0"/>
+              <a:t> Notebook </a:t>
+            </a:r>
+            <a:r>
+              <a:rPr lang="en-US" sz="2000" dirty="0" err="1" smtClean="0"/>
+              <a:t>akan</a:t>
+            </a:r>
+            <a:r>
+              <a:rPr lang="en-US" sz="2000" dirty="0" smtClean="0"/>
+              <a:t> </a:t>
+            </a:r>
+            <a:r>
+              <a:rPr lang="en-US" sz="2000" dirty="0" err="1" smtClean="0"/>
+              <a:t>terbuka</a:t>
+            </a:r>
+            <a:r>
+              <a:rPr lang="en-US" sz="2000" dirty="0" smtClean="0"/>
+              <a:t> </a:t>
+            </a:r>
+            <a:r>
+              <a:rPr lang="en-US" sz="2000" dirty="0" err="1" smtClean="0"/>
+              <a:t>pada</a:t>
+            </a:r>
+            <a:r>
+              <a:rPr lang="en-US" sz="2000" dirty="0" smtClean="0"/>
+              <a:t> default browser </a:t>
+            </a:r>
+            <a:r>
+              <a:rPr lang="en-US" sz="2000" dirty="0" err="1" smtClean="0"/>
+              <a:t>kita</a:t>
+            </a:r>
+            <a:r>
+              <a:rPr lang="en-US" sz="2000" dirty="0" smtClean="0"/>
+              <a:t>.</a:t>
+            </a:r>
+            <a:endParaRPr lang="en-US" sz="2000" dirty="0"/>
           </a:p>
         </p:txBody>
       </p:sp>
     </p:spTree>
     <p:extLst>
       <p:ext uri="{BB962C8B-B14F-4D97-AF65-F5344CB8AC3E}">
-        <p14:creationId xmlns:p14="http://schemas.microsoft.com/office/powerpoint/2010/main" val="3849200627"/>
+        <p14:creationId xmlns:p14="http://schemas.microsoft.com/office/powerpoint/2010/main" val="2234774568"/>
       </p:ext>
     </p:extLst>
   </p:cSld>
@@ -14587,7 +15022,19 @@
             <a:pPr algn="l"/>
             <a:r>
               <a:rPr lang="en-US" dirty="0" err="1" smtClean="0"/>
-              <a:t>Sumber</a:t>
+              <a:t>Seaborn</a:t>
+            </a:r>
+            <a:r>
+              <a:rPr lang="en-US" dirty="0" smtClean="0"/>
+              <a:t> </a:t>
+            </a:r>
+            <a:r>
+              <a:rPr lang="en-US" dirty="0" err="1" smtClean="0"/>
+              <a:t>Pada</a:t>
+            </a:r>
+            <a:r>
+              <a:rPr lang="en-US" dirty="0" smtClean="0"/>
+              <a:t> Python</a:t>
             </a:r>
             <a:endParaRPr lang="en-US" dirty="0"/>
           </a:p>
@@ -14611,7 +15058,773 @@
         </p:spPr>
         <p:txBody>
           <a:bodyPr>
+            <a:normAutofit lnSpcReduction="10000"/>
+          </a:bodyPr>
+          <a:lstStyle/>
+          <a:p>
+            <a:pPr marL="0" indent="0">
+              <a:buNone/>
+            </a:pPr>
+            <a:r>
+              <a:rPr lang="en-US" sz="2000" dirty="0" err="1"/>
+              <a:t>Seaborn</a:t>
+            </a:r>
+            <a:r>
+              <a:rPr lang="en-US" sz="2000" dirty="0"/>
+              <a:t> </a:t>
+            </a:r>
+            <a:r>
+              <a:rPr lang="en-US" sz="2000" dirty="0" err="1"/>
+              <a:t>adalah</a:t>
+            </a:r>
+            <a:r>
+              <a:rPr lang="en-US" sz="2000" dirty="0"/>
+              <a:t> </a:t>
+            </a:r>
+            <a:r>
+              <a:rPr lang="en-US" sz="2000" dirty="0" err="1"/>
+              <a:t>perpustakaan</a:t>
+            </a:r>
+            <a:r>
+              <a:rPr lang="en-US" sz="2000" dirty="0"/>
+              <a:t> </a:t>
+            </a:r>
+            <a:r>
+              <a:rPr lang="en-US" sz="2000" dirty="0" err="1"/>
+              <a:t>visualisasi</a:t>
+            </a:r>
+            <a:r>
+              <a:rPr lang="en-US" sz="2000" dirty="0"/>
+              <a:t> data Python </a:t>
+            </a:r>
+            <a:r>
+              <a:rPr lang="en-US" sz="2000" dirty="0" err="1"/>
+              <a:t>berdasarkan</a:t>
+            </a:r>
+            <a:r>
+              <a:rPr lang="en-US" sz="2000" dirty="0"/>
+              <a:t> </a:t>
+            </a:r>
+            <a:r>
+              <a:rPr lang="en-US" sz="2000" dirty="0" err="1"/>
+              <a:t>matplotlib</a:t>
+            </a:r>
+            <a:r>
+              <a:rPr lang="en-US" sz="2000" dirty="0"/>
+              <a:t>. </a:t>
+            </a:r>
+            <a:r>
+              <a:rPr lang="en-US" sz="2000" dirty="0" err="1"/>
+              <a:t>Seaborn</a:t>
+            </a:r>
+            <a:r>
+              <a:rPr lang="en-US" sz="2000" dirty="0"/>
+              <a:t> </a:t>
+            </a:r>
+            <a:r>
+              <a:rPr lang="en-US" sz="2000" dirty="0" err="1"/>
+              <a:t>menyediakan</a:t>
+            </a:r>
+            <a:r>
+              <a:rPr lang="en-US" sz="2000" dirty="0"/>
+              <a:t> </a:t>
+            </a:r>
+            <a:r>
+              <a:rPr lang="en-US" sz="2000" dirty="0" err="1"/>
+              <a:t>antarmuka</a:t>
+            </a:r>
+            <a:r>
+              <a:rPr lang="en-US" sz="2000" dirty="0"/>
+              <a:t> </a:t>
+            </a:r>
+            <a:r>
+              <a:rPr lang="en-US" sz="2000" dirty="0" err="1"/>
+              <a:t>tingkat</a:t>
+            </a:r>
+            <a:r>
+              <a:rPr lang="en-US" sz="2000" dirty="0"/>
+              <a:t> </a:t>
+            </a:r>
+            <a:r>
+              <a:rPr lang="en-US" sz="2000" dirty="0" err="1"/>
+              <a:t>tinggi</a:t>
+            </a:r>
+            <a:r>
+              <a:rPr lang="en-US" sz="2000" dirty="0"/>
+              <a:t> </a:t>
+            </a:r>
+            <a:r>
+              <a:rPr lang="en-US" sz="2000" dirty="0" err="1"/>
+              <a:t>untuk</a:t>
+            </a:r>
+            <a:r>
+              <a:rPr lang="en-US" sz="2000" dirty="0"/>
+              <a:t> </a:t>
+            </a:r>
+            <a:r>
+              <a:rPr lang="en-US" sz="2000" dirty="0" err="1"/>
+              <a:t>menggambar</a:t>
+            </a:r>
+            <a:r>
+              <a:rPr lang="en-US" sz="2000" dirty="0"/>
+              <a:t> </a:t>
+            </a:r>
+            <a:r>
+              <a:rPr lang="en-US" sz="2000" dirty="0" err="1"/>
+              <a:t>grafik</a:t>
+            </a:r>
+            <a:r>
+              <a:rPr lang="en-US" sz="2000" dirty="0"/>
+              <a:t> </a:t>
+            </a:r>
+            <a:r>
+              <a:rPr lang="en-US" sz="2000" dirty="0" err="1"/>
+              <a:t>statistik</a:t>
+            </a:r>
+            <a:r>
+              <a:rPr lang="en-US" sz="2000" dirty="0"/>
+              <a:t> yang </a:t>
+            </a:r>
+            <a:r>
+              <a:rPr lang="en-US" sz="2000" dirty="0" err="1"/>
+              <a:t>menarik</a:t>
+            </a:r>
+            <a:r>
+              <a:rPr lang="en-US" sz="2000" dirty="0"/>
+              <a:t> </a:t>
+            </a:r>
+            <a:r>
+              <a:rPr lang="en-US" sz="2000" dirty="0" err="1"/>
+              <a:t>dan</a:t>
+            </a:r>
+            <a:r>
+              <a:rPr lang="en-US" sz="2000" dirty="0"/>
+              <a:t> </a:t>
+            </a:r>
+            <a:r>
+              <a:rPr lang="en-US" sz="2000" dirty="0" err="1"/>
+              <a:t>informatif</a:t>
+            </a:r>
+            <a:r>
+              <a:rPr lang="en-US" sz="2000" dirty="0" smtClean="0"/>
+              <a:t>. Cara install </a:t>
+            </a:r>
+            <a:r>
+              <a:rPr lang="en-US" sz="2000" dirty="0" err="1" smtClean="0"/>
+              <a:t>Seaborn</a:t>
+            </a:r>
+            <a:r>
+              <a:rPr lang="en-US" sz="2000" dirty="0" smtClean="0"/>
+              <a:t> </a:t>
+            </a:r>
+            <a:r>
+              <a:rPr lang="en-US" sz="2000" dirty="0" err="1" smtClean="0"/>
+              <a:t>cukup</a:t>
+            </a:r>
+            <a:r>
+              <a:rPr lang="en-US" sz="2000" dirty="0" smtClean="0"/>
+              <a:t> </a:t>
+            </a:r>
+            <a:r>
+              <a:rPr lang="en-US" sz="2000" dirty="0" err="1" smtClean="0"/>
+              <a:t>mudah</a:t>
+            </a:r>
+            <a:r>
+              <a:rPr lang="en-US" sz="2000" dirty="0" smtClean="0"/>
+              <a:t>, </a:t>
+            </a:r>
+            <a:r>
+              <a:rPr lang="en-US" sz="2000" dirty="0" err="1" smtClean="0"/>
+              <a:t>kita</a:t>
+            </a:r>
+            <a:r>
+              <a:rPr lang="en-US" sz="2000" dirty="0" smtClean="0"/>
+              <a:t> </a:t>
+            </a:r>
+            <a:r>
+              <a:rPr lang="en-US" sz="2000" dirty="0" err="1" smtClean="0"/>
+              <a:t>dapat</a:t>
+            </a:r>
+            <a:r>
+              <a:rPr lang="en-US" sz="2000" dirty="0" smtClean="0"/>
+              <a:t> </a:t>
+            </a:r>
+            <a:r>
+              <a:rPr lang="en-US" sz="2000" dirty="0" err="1" smtClean="0"/>
+              <a:t>menginstall-nya</a:t>
+            </a:r>
+            <a:r>
+              <a:rPr lang="en-US" sz="2000" dirty="0" smtClean="0"/>
+              <a:t> </a:t>
+            </a:r>
+            <a:r>
+              <a:rPr lang="en-US" sz="2000" dirty="0" err="1" smtClean="0"/>
+              <a:t>lewat</a:t>
+            </a:r>
+            <a:r>
+              <a:rPr lang="en-US" sz="2000" dirty="0" smtClean="0"/>
+              <a:t> </a:t>
+            </a:r>
+            <a:r>
+              <a:rPr lang="en-US" sz="2000" dirty="0" err="1" smtClean="0"/>
+              <a:t>Jupyter</a:t>
+            </a:r>
+            <a:r>
+              <a:rPr lang="en-US" sz="2000" dirty="0" smtClean="0"/>
+              <a:t> Notebook </a:t>
+            </a:r>
+            <a:r>
+              <a:rPr lang="en-US" sz="2000" dirty="0" err="1" smtClean="0"/>
+              <a:t>dengan</a:t>
+            </a:r>
+            <a:r>
+              <a:rPr lang="en-US" sz="2000" dirty="0" smtClean="0"/>
+              <a:t> </a:t>
+            </a:r>
+            <a:r>
+              <a:rPr lang="en-US" sz="2000" dirty="0" err="1" smtClean="0"/>
+              <a:t>mengetikkan</a:t>
+            </a:r>
+            <a:r>
+              <a:rPr lang="en-US" sz="2000" dirty="0" smtClean="0"/>
+              <a:t> </a:t>
+            </a:r>
+            <a:r>
+              <a:rPr lang="en-US" sz="2000" dirty="0" err="1" smtClean="0"/>
+              <a:t>sintaks</a:t>
+            </a:r>
+            <a:r>
+              <a:rPr lang="en-US" sz="2000" dirty="0" smtClean="0"/>
+              <a:t> </a:t>
+            </a:r>
+            <a:r>
+              <a:rPr lang="en-US" sz="2000" dirty="0" err="1" smtClean="0"/>
+              <a:t>berikut</a:t>
+            </a:r>
+            <a:r>
+              <a:rPr lang="en-US" sz="2000" dirty="0" smtClean="0"/>
+              <a:t>.</a:t>
+            </a:r>
+          </a:p>
+          <a:p>
+            <a:pPr marL="0" indent="0">
+              <a:buNone/>
+            </a:pPr>
+            <a:endParaRPr lang="en-US" sz="2000" dirty="0" smtClean="0"/>
+          </a:p>
+          <a:p>
+            <a:pPr marL="0" indent="0">
+              <a:buNone/>
+            </a:pPr>
+            <a:endParaRPr lang="en-US" sz="2000" dirty="0"/>
+          </a:p>
+          <a:p>
+            <a:pPr marL="0" indent="0">
+              <a:buNone/>
+            </a:pPr>
+            <a:endParaRPr lang="en-US" sz="2000" dirty="0" smtClean="0"/>
+          </a:p>
+          <a:p>
+            <a:pPr marL="0" indent="0">
+              <a:buNone/>
+            </a:pPr>
+            <a:endParaRPr lang="en-US" sz="2000" dirty="0"/>
+          </a:p>
+          <a:p>
+            <a:pPr marL="0" indent="0">
+              <a:buNone/>
+            </a:pPr>
+            <a:endParaRPr lang="en-US" sz="2000" dirty="0" smtClean="0"/>
+          </a:p>
+          <a:p>
+            <a:pPr marL="0" indent="0">
+              <a:buNone/>
+            </a:pPr>
+            <a:endParaRPr lang="en-US" sz="2000" dirty="0"/>
+          </a:p>
+          <a:p>
+            <a:pPr marL="0" indent="0">
+              <a:buNone/>
+            </a:pPr>
+            <a:endParaRPr lang="en-US" sz="2000" dirty="0" smtClean="0"/>
+          </a:p>
+          <a:p>
+            <a:pPr marL="0" indent="0">
+              <a:buNone/>
+            </a:pPr>
+            <a:r>
+              <a:rPr lang="en-US" sz="2000" dirty="0" err="1" smtClean="0"/>
+              <a:t>Jika</a:t>
+            </a:r>
+            <a:r>
+              <a:rPr lang="en-US" sz="2000" dirty="0" smtClean="0"/>
+              <a:t> </a:t>
+            </a:r>
+            <a:r>
+              <a:rPr lang="en-US" sz="2000" dirty="0" err="1" smtClean="0"/>
+              <a:t>kita</a:t>
+            </a:r>
+            <a:r>
+              <a:rPr lang="en-US" sz="2000" dirty="0" smtClean="0"/>
+              <a:t> </a:t>
+            </a:r>
+            <a:r>
+              <a:rPr lang="en-US" sz="2000" dirty="0" err="1" smtClean="0"/>
+              <a:t>sudah</a:t>
+            </a:r>
+            <a:r>
+              <a:rPr lang="en-US" sz="2000" dirty="0" smtClean="0"/>
+              <a:t> </a:t>
+            </a:r>
+            <a:r>
+              <a:rPr lang="en-US" sz="2000" dirty="0" err="1" smtClean="0"/>
+              <a:t>mengimport</a:t>
+            </a:r>
+            <a:r>
+              <a:rPr lang="en-US" sz="2000" dirty="0"/>
+              <a:t> </a:t>
+            </a:r>
+            <a:r>
+              <a:rPr lang="en-US" sz="2000" dirty="0" err="1" smtClean="0"/>
+              <a:t>Seaborn</a:t>
+            </a:r>
+            <a:r>
+              <a:rPr lang="en-US" sz="2000" dirty="0" smtClean="0"/>
+              <a:t>, </a:t>
+            </a:r>
+            <a:r>
+              <a:rPr lang="en-US" sz="2000" dirty="0" err="1" smtClean="0"/>
+              <a:t>kita</a:t>
+            </a:r>
+            <a:r>
+              <a:rPr lang="en-US" sz="2000" dirty="0" smtClean="0"/>
+              <a:t> </a:t>
+            </a:r>
+            <a:r>
+              <a:rPr lang="en-US" sz="2000" dirty="0" err="1" smtClean="0"/>
+              <a:t>dapat</a:t>
+            </a:r>
+            <a:r>
+              <a:rPr lang="en-US" sz="2000" dirty="0" smtClean="0"/>
+              <a:t> </a:t>
+            </a:r>
+            <a:r>
+              <a:rPr lang="en-US" sz="2000" dirty="0" err="1" smtClean="0"/>
+              <a:t>melihat</a:t>
+            </a:r>
+            <a:r>
+              <a:rPr lang="en-US" sz="2000" dirty="0" smtClean="0"/>
+              <a:t> </a:t>
+            </a:r>
+            <a:r>
+              <a:rPr lang="en-US" sz="2000" dirty="0" err="1" smtClean="0"/>
+              <a:t>apakah</a:t>
+            </a:r>
+            <a:r>
+              <a:rPr lang="en-US" sz="2000" dirty="0" smtClean="0"/>
+              <a:t> </a:t>
+            </a:r>
+            <a:r>
+              <a:rPr lang="en-US" sz="2000" dirty="0" err="1" smtClean="0"/>
+              <a:t>Seaborn</a:t>
+            </a:r>
+            <a:r>
+              <a:rPr lang="en-US" sz="2000" dirty="0" smtClean="0"/>
+              <a:t> </a:t>
+            </a:r>
+            <a:r>
+              <a:rPr lang="en-US" sz="2000" dirty="0" err="1" smtClean="0"/>
+              <a:t>sudah</a:t>
+            </a:r>
+            <a:r>
+              <a:rPr lang="en-US" sz="2000" dirty="0" smtClean="0"/>
+              <a:t> </a:t>
+            </a:r>
+            <a:r>
+              <a:rPr lang="en-US" sz="2000" dirty="0" err="1" smtClean="0"/>
+              <a:t>terpasang</a:t>
+            </a:r>
+            <a:r>
+              <a:rPr lang="en-US" sz="2000" dirty="0" smtClean="0"/>
+              <a:t> </a:t>
+            </a:r>
+            <a:r>
+              <a:rPr lang="en-US" sz="2000" dirty="0" err="1" smtClean="0"/>
+              <a:t>dengan</a:t>
+            </a:r>
+            <a:r>
+              <a:rPr lang="en-US" sz="2000" dirty="0" smtClean="0"/>
+              <a:t> </a:t>
+            </a:r>
+            <a:r>
+              <a:rPr lang="en-US" sz="2000" dirty="0" err="1" smtClean="0"/>
+              <a:t>benar</a:t>
+            </a:r>
+            <a:r>
+              <a:rPr lang="en-US" sz="2000" dirty="0" smtClean="0"/>
+              <a:t> </a:t>
+            </a:r>
+            <a:r>
+              <a:rPr lang="en-US" sz="2000" dirty="0" err="1" smtClean="0"/>
+              <a:t>atau</a:t>
+            </a:r>
+            <a:r>
+              <a:rPr lang="en-US" sz="2000" dirty="0" smtClean="0"/>
+              <a:t> </a:t>
+            </a:r>
+            <a:r>
+              <a:rPr lang="en-US" sz="2000" dirty="0" err="1" smtClean="0"/>
+              <a:t>tidak</a:t>
+            </a:r>
+            <a:r>
+              <a:rPr lang="en-US" sz="2000" dirty="0" smtClean="0"/>
+              <a:t> </a:t>
+            </a:r>
+            <a:r>
+              <a:rPr lang="en-US" sz="2000" dirty="0" err="1" smtClean="0"/>
+              <a:t>dengan</a:t>
+            </a:r>
+            <a:r>
+              <a:rPr lang="en-US" sz="2000" dirty="0" smtClean="0"/>
+              <a:t> </a:t>
+            </a:r>
+            <a:r>
+              <a:rPr lang="en-US" sz="2000" dirty="0" err="1" smtClean="0"/>
+              <a:t>mengetikkan</a:t>
+            </a:r>
+            <a:r>
+              <a:rPr lang="en-US" sz="2000" dirty="0" smtClean="0"/>
+              <a:t> </a:t>
+            </a:r>
+            <a:r>
+              <a:rPr lang="en-US" sz="2000" dirty="0" err="1" smtClean="0"/>
+              <a:t>sintaks</a:t>
+            </a:r>
+            <a:r>
+              <a:rPr lang="en-US" sz="2000" dirty="0" smtClean="0"/>
+              <a:t> </a:t>
+            </a:r>
+            <a:r>
+              <a:rPr lang="en-US" sz="2000" dirty="0" err="1" smtClean="0"/>
+              <a:t>sns</a:t>
+            </a:r>
+            <a:r>
+              <a:rPr lang="en-US" sz="2000" dirty="0" smtClean="0"/>
+              <a:t>.__version__ </a:t>
+            </a:r>
+            <a:r>
+              <a:rPr lang="en-US" sz="2000" dirty="0" err="1" smtClean="0"/>
+              <a:t>dan</a:t>
+            </a:r>
+            <a:r>
+              <a:rPr lang="en-US" sz="2000" dirty="0" smtClean="0"/>
+              <a:t> </a:t>
+            </a:r>
+            <a:r>
+              <a:rPr lang="en-US" sz="2000" dirty="0" err="1" smtClean="0"/>
+              <a:t>outputnya</a:t>
+            </a:r>
+            <a:r>
+              <a:rPr lang="en-US" sz="2000" dirty="0" smtClean="0"/>
+              <a:t> </a:t>
+            </a:r>
+            <a:r>
+              <a:rPr lang="en-US" sz="2000" dirty="0" err="1" smtClean="0"/>
+              <a:t>jika</a:t>
+            </a:r>
+            <a:r>
+              <a:rPr lang="en-US" sz="2000" dirty="0" smtClean="0"/>
+              <a:t> </a:t>
+            </a:r>
+            <a:r>
+              <a:rPr lang="en-US" sz="2000" dirty="0" err="1" smtClean="0"/>
+              <a:t>benar</a:t>
+            </a:r>
+            <a:r>
+              <a:rPr lang="en-US" sz="2000" dirty="0" smtClean="0"/>
+              <a:t> </a:t>
+            </a:r>
+            <a:r>
+              <a:rPr lang="en-US" sz="2000" dirty="0" err="1" smtClean="0"/>
+              <a:t>akan</a:t>
+            </a:r>
+            <a:r>
+              <a:rPr lang="en-US" sz="2000" dirty="0" smtClean="0"/>
+              <a:t> </a:t>
+            </a:r>
+            <a:r>
+              <a:rPr lang="en-US" sz="2000" dirty="0" err="1" smtClean="0"/>
+              <a:t>menghasilkan</a:t>
+            </a:r>
+            <a:r>
+              <a:rPr lang="en-US" sz="2000" dirty="0" smtClean="0"/>
+              <a:t> </a:t>
+            </a:r>
+            <a:r>
+              <a:rPr lang="en-US" sz="2000" dirty="0" err="1" smtClean="0"/>
+              <a:t>versi</a:t>
+            </a:r>
+            <a:r>
+              <a:rPr lang="en-US" sz="2000" dirty="0" smtClean="0"/>
+              <a:t> </a:t>
+            </a:r>
+            <a:r>
+              <a:rPr lang="en-US" sz="2000" dirty="0" err="1" smtClean="0"/>
+              <a:t>dari</a:t>
+            </a:r>
+            <a:r>
+              <a:rPr lang="en-US" sz="2000" dirty="0" smtClean="0"/>
+              <a:t> </a:t>
+            </a:r>
+            <a:r>
+              <a:rPr lang="en-US" sz="2000" dirty="0" err="1" smtClean="0"/>
+              <a:t>Seaborn</a:t>
+            </a:r>
+            <a:r>
+              <a:rPr lang="en-US" sz="2000" dirty="0" smtClean="0"/>
+              <a:t> </a:t>
+            </a:r>
+            <a:r>
+              <a:rPr lang="en-US" sz="2000" dirty="0" err="1" smtClean="0"/>
+              <a:t>tersebut</a:t>
+            </a:r>
+            <a:r>
+              <a:rPr lang="en-US" sz="2000" dirty="0" smtClean="0"/>
+              <a:t>.</a:t>
+            </a:r>
+            <a:endParaRPr lang="en-US" sz="2000" dirty="0"/>
+          </a:p>
+        </p:txBody>
+      </p:sp>
+      <p:pic>
+        <p:nvPicPr>
+          <p:cNvPr id="1026" name="Picture 2"/>
+          <p:cNvPicPr>
+            <a:picLocks noChangeAspect="1" noChangeArrowheads="1"/>
+          </p:cNvPicPr>
+          <p:nvPr/>
+        </p:nvPicPr>
+        <p:blipFill>
+          <a:blip r:embed="rId2">
+            <a:extLst>
+              <a:ext uri="{28A0092B-C50C-407E-A947-70E740481C1C}">
+                <a14:useLocalDpi xmlns:a14="http://schemas.microsoft.com/office/drawing/2010/main" val="0"/>
+              </a:ext>
+            </a:extLst>
+          </a:blip>
+          <a:srcRect/>
+          <a:stretch>
+            <a:fillRect/>
+          </a:stretch>
+        </p:blipFill>
+        <p:spPr bwMode="auto">
+          <a:xfrm>
+            <a:off x="3089564" y="3276600"/>
+            <a:ext cx="3352800" cy="2154507"/>
+          </a:xfrm>
+          <a:prstGeom prst="rect">
+            <a:avLst/>
+          </a:prstGeom>
+          <a:noFill/>
+          <a:ln>
+            <a:noFill/>
+          </a:ln>
+          <a:effectLst/>
+          <a:extLst>
+            <a:ext uri="{909E8E84-426E-40DD-AFC4-6F175D3DCCD1}">
+              <a14:hiddenFill xmlns:a14="http://schemas.microsoft.com/office/drawing/2010/main">
+                <a:solidFill>
+                  <a:schemeClr val="accent1"/>
+                </a:solidFill>
+              </a14:hiddenFill>
+            </a:ext>
+            <a:ext uri="{91240B29-F687-4F45-9708-019B960494DF}">
+              <a14:hiddenLine xmlns:a14="http://schemas.microsoft.com/office/drawing/2010/main" w="9525">
+                <a:solidFill>
+                  <a:schemeClr val="tx1"/>
+                </a:solidFill>
+                <a:miter lim="800000"/>
+                <a:headEnd/>
+                <a:tailEnd/>
+              </a14:hiddenLine>
+            </a:ext>
+            <a:ext uri="{AF507438-7753-43E0-B8FC-AC1667EBCBE1}">
+              <a14:hiddenEffects xmlns:a14="http://schemas.microsoft.com/office/drawing/2010/main">
+                <a:effectLst>
+                  <a:outerShdw dist="35921" dir="2700000" algn="ctr" rotWithShape="0">
+                    <a:schemeClr val="bg2"/>
+                  </a:outerShdw>
+                </a:effectLst>
+              </a14:hiddenEffects>
+            </a:ext>
+          </a:extLst>
+        </p:spPr>
+      </p:pic>
+    </p:spTree>
+    <p:extLst>
+      <p:ext uri="{BB962C8B-B14F-4D97-AF65-F5344CB8AC3E}">
+        <p14:creationId xmlns:p14="http://schemas.microsoft.com/office/powerpoint/2010/main" val="2873799462"/>
+      </p:ext>
+    </p:extLst>
+  </p:cSld>
+  <p:clrMapOvr>
+    <a:masterClrMapping/>
+  </p:clrMapOvr>
+  <p:timing>
+    <p:tnLst>
+      <p:par>
+        <p:cTn id="1" dur="indefinite" restart="never" nodeType="tmRoot"/>
+      </p:par>
+    </p:tnLst>
+  </p:timing>
+</p:sld>
+</file>
+
+<file path=ppt/slides/slide26.xml><?xml version="1.0" encoding="utf-8"?>
+<p:sld xmlns:a="http://schemas.openxmlformats.org/drawingml/2006/main" xmlns:r="http://schemas.openxmlformats.org/officeDocument/2006/relationships" xmlns:p="http://schemas.openxmlformats.org/presentationml/2006/main">
+  <p:cSld>
+    <p:spTree>
+      <p:nvGrpSpPr>
+        <p:cNvPr id="1" name=""/>
+        <p:cNvGrpSpPr/>
+        <p:nvPr/>
+      </p:nvGrpSpPr>
+      <p:grpSpPr>
+        <a:xfrm>
+          <a:off x="0" y="0"/>
+          <a:ext cx="0" cy="0"/>
+          <a:chOff x="0" y="0"/>
+          <a:chExt cx="0" cy="0"/>
+        </a:xfrm>
+      </p:grpSpPr>
+      <p:sp>
+        <p:nvSpPr>
+          <p:cNvPr id="3" name="Content Placeholder 2"/>
+          <p:cNvSpPr>
+            <a:spLocks noGrp="1"/>
+          </p:cNvSpPr>
+          <p:nvPr>
+            <p:ph idx="1"/>
+          </p:nvPr>
+        </p:nvSpPr>
+        <p:spPr/>
+        <p:txBody>
+          <a:bodyPr>
             <a:normAutofit/>
+          </a:bodyPr>
+          <a:lstStyle/>
+          <a:p>
+            <a:pPr marL="0" indent="0" algn="ctr">
+              <a:buNone/>
+            </a:pPr>
+            <a:endParaRPr lang="en-US" sz="4800" dirty="0" smtClean="0"/>
+          </a:p>
+          <a:p>
+            <a:pPr marL="0" indent="0" algn="ctr">
+              <a:buNone/>
+            </a:pPr>
+            <a:endParaRPr lang="en-US" sz="4800" dirty="0"/>
+          </a:p>
+          <a:p>
+            <a:pPr marL="0" indent="0" algn="ctr">
+              <a:buNone/>
+            </a:pPr>
+            <a:r>
+              <a:rPr lang="en-US" sz="4800" dirty="0" err="1" smtClean="0"/>
+              <a:t>Terima</a:t>
+            </a:r>
+            <a:r>
+              <a:rPr lang="en-US" sz="4800" dirty="0" smtClean="0"/>
+              <a:t> </a:t>
+            </a:r>
+            <a:r>
+              <a:rPr lang="en-US" sz="4800" dirty="0" err="1" smtClean="0"/>
+              <a:t>Kasih</a:t>
+            </a:r>
+            <a:endParaRPr lang="en-US" sz="4800" dirty="0"/>
+          </a:p>
+        </p:txBody>
+      </p:sp>
+    </p:spTree>
+    <p:extLst>
+      <p:ext uri="{BB962C8B-B14F-4D97-AF65-F5344CB8AC3E}">
+        <p14:creationId xmlns:p14="http://schemas.microsoft.com/office/powerpoint/2010/main" val="3849200627"/>
+      </p:ext>
+    </p:extLst>
+  </p:cSld>
+  <p:clrMapOvr>
+    <a:masterClrMapping/>
+  </p:clrMapOvr>
+  <p:timing>
+    <p:tnLst>
+      <p:par>
+        <p:cTn id="1" dur="indefinite" restart="never" nodeType="tmRoot"/>
+      </p:par>
+    </p:tnLst>
+  </p:timing>
+</p:sld>
+</file>
+
+<file path=ppt/slides/slide27.xml><?xml version="1.0" encoding="utf-8"?>
+<p:sld xmlns:a="http://schemas.openxmlformats.org/drawingml/2006/main" xmlns:r="http://schemas.openxmlformats.org/officeDocument/2006/relationships" xmlns:p="http://schemas.openxmlformats.org/presentationml/2006/main">
+  <p:cSld>
+    <p:spTree>
+      <p:nvGrpSpPr>
+        <p:cNvPr id="1" name=""/>
+        <p:cNvGrpSpPr/>
+        <p:nvPr/>
+      </p:nvGrpSpPr>
+      <p:grpSpPr>
+        <a:xfrm>
+          <a:off x="0" y="0"/>
+          <a:ext cx="0" cy="0"/>
+          <a:chOff x="0" y="0"/>
+          <a:chExt cx="0" cy="0"/>
+        </a:xfrm>
+      </p:grpSpPr>
+      <p:sp>
+        <p:nvSpPr>
+          <p:cNvPr id="2" name="Title 1"/>
+          <p:cNvSpPr>
+            <a:spLocks noGrp="1"/>
+          </p:cNvSpPr>
+          <p:nvPr>
+            <p:ph type="title"/>
+          </p:nvPr>
+        </p:nvSpPr>
+        <p:spPr/>
+        <p:txBody>
+          <a:bodyPr/>
+          <a:lstStyle/>
+          <a:p>
+            <a:pPr algn="l"/>
+            <a:r>
+              <a:rPr lang="en-US" dirty="0" err="1" smtClean="0"/>
+              <a:t>Sumber</a:t>
+            </a:r>
+            <a:endParaRPr lang="en-US" dirty="0"/>
+          </a:p>
+        </p:txBody>
+      </p:sp>
+      <p:sp>
+        <p:nvSpPr>
+          <p:cNvPr id="3" name="Content Placeholder 2"/>
+          <p:cNvSpPr>
+            <a:spLocks noGrp="1"/>
+          </p:cNvSpPr>
+          <p:nvPr>
+            <p:ph idx="1"/>
+          </p:nvPr>
+        </p:nvSpPr>
+        <p:spPr>
+          <a:xfrm>
+            <a:off x="0" y="1600200"/>
+            <a:ext cx="9144000" cy="5257800"/>
+          </a:xfrm>
+        </p:spPr>
+        <p:txBody>
+          <a:bodyPr>
+            <a:normAutofit fontScale="92500" lnSpcReduction="20000"/>
           </a:bodyPr>
           <a:lstStyle/>
           <a:p>
@@ -14801,7 +16014,6 @@
               <a:rPr lang="en-US" sz="2000" dirty="0" smtClean="0"/>
               <a:t> </a:t>
             </a:r>
-            <a:endParaRPr lang="en-US" sz="2000" dirty="0" smtClean="0"/>
           </a:p>
           <a:p>
             <a:pPr marL="0" indent="0">
@@ -14816,6 +16028,49 @@
             <a:r>
               <a:rPr lang="en-US" sz="2000" dirty="0" smtClean="0">
                 <a:hlinkClick r:id="rId12"/>
+              </a:rPr>
+              <a:t>/</a:t>
+            </a:r>
+            <a:r>
+              <a:rPr lang="en-US" sz="2000" dirty="0" smtClean="0"/>
+              <a:t> </a:t>
+            </a:r>
+            <a:endParaRPr lang="en-US" sz="2000" dirty="0" smtClean="0"/>
+          </a:p>
+          <a:p>
+            <a:pPr marL="0" indent="0">
+              <a:buNone/>
+            </a:pPr>
+            <a:r>
+              <a:rPr lang="en-US" sz="2000" dirty="0">
+                <a:hlinkClick r:id="rId13"/>
+              </a:rPr>
+              <a:t>https://medium.com/@</a:t>
+            </a:r>
+            <a:r>
+              <a:rPr lang="en-US" sz="2000" dirty="0" smtClean="0">
+                <a:hlinkClick r:id="rId13"/>
+              </a:rPr>
+              <a:t>renopp/perjalanan-belajar-deep-learning-introduction-dan-setup-environment-part-1-afc6d731960f</a:t>
+            </a:r>
+            <a:r>
+              <a:rPr lang="en-US" sz="2000" dirty="0" smtClean="0"/>
+              <a:t> </a:t>
+            </a:r>
+          </a:p>
+          <a:p>
+            <a:pPr marL="0" indent="0">
+              <a:buNone/>
+            </a:pPr>
+            <a:r>
+              <a:rPr lang="en-US" sz="2000" dirty="0">
+                <a:hlinkClick r:id="rId14"/>
+              </a:rPr>
+              <a:t>https://seaborn.pydata.org</a:t>
+            </a:r>
+            <a:r>
+              <a:rPr lang="en-US" sz="2000" dirty="0" smtClean="0">
+                <a:hlinkClick r:id="rId14"/>
               </a:rPr>
               <a:t>/</a:t>
             </a:r>

</xml_diff>